<commit_message>
updated slide lab 2
</commit_message>
<xml_diff>
--- a/esercitazioni/Laboratory_22-23/Session_2/Lab_02_Slides.pptx
+++ b/esercitazioni/Laboratory_22-23/Session_2/Lab_02_Slides.pptx
@@ -16,8 +16,6 @@
     <p:sldId id="265" r:id="rId10"/>
     <p:sldId id="266" r:id="rId11"/>
     <p:sldId id="267" r:id="rId12"/>
-    <p:sldId id="268" r:id="rId13"/>
-    <p:sldId id="269" r:id="rId14"/>
   </p:sldIdLst>
   <p:sldSz cx="12192000" cy="6858000"/>
   <p:notesSz cx="7559675" cy="10691813"/>
@@ -310,7 +308,7 @@
           <a:p>
             <a:fld id="{4AAD347D-5ACD-4C99-B74B-A9C85AD731AF}" type="datetimeFigureOut">
               <a:rPr lang="en-US" dirty="0"/>
-              <a:t>10/7/2022</a:t>
+              <a:t>10/17/2022</a:t>
             </a:fld>
             <a:endParaRPr lang="en-US" dirty="0"/>
           </a:p>
@@ -585,7 +583,7 @@
           <a:p>
             <a:fld id="{4509A250-FF31-4206-8172-F9D3106AACB1}" type="datetimeFigureOut">
               <a:rPr lang="en-US" dirty="0"/>
-              <a:t>10/7/2022</a:t>
+              <a:t>10/17/2022</a:t>
             </a:fld>
             <a:endParaRPr lang="en-US" dirty="0"/>
           </a:p>
@@ -779,7 +777,7 @@
           <a:p>
             <a:fld id="{4509A250-FF31-4206-8172-F9D3106AACB1}" type="datetimeFigureOut">
               <a:rPr lang="en-US" dirty="0"/>
-              <a:t>10/7/2022</a:t>
+              <a:t>10/17/2022</a:t>
             </a:fld>
             <a:endParaRPr lang="en-US" dirty="0"/>
           </a:p>
@@ -1052,7 +1050,7 @@
           <a:p>
             <a:fld id="{4509A250-FF31-4206-8172-F9D3106AACB1}" type="datetimeFigureOut">
               <a:rPr lang="en-US" dirty="0"/>
-              <a:t>10/7/2022</a:t>
+              <a:t>10/17/2022</a:t>
             </a:fld>
             <a:endParaRPr lang="en-US" dirty="0"/>
           </a:p>
@@ -1393,7 +1391,7 @@
           <a:p>
             <a:fld id="{4509A250-FF31-4206-8172-F9D3106AACB1}" type="datetimeFigureOut">
               <a:rPr lang="en-US" dirty="0"/>
-              <a:t>10/7/2022</a:t>
+              <a:t>10/17/2022</a:t>
             </a:fld>
             <a:endParaRPr lang="en-US" dirty="0"/>
           </a:p>
@@ -2016,7 +2014,7 @@
           <a:p>
             <a:fld id="{4509A250-FF31-4206-8172-F9D3106AACB1}" type="datetimeFigureOut">
               <a:rPr lang="en-US" dirty="0"/>
-              <a:t>10/7/2022</a:t>
+              <a:t>10/17/2022</a:t>
             </a:fld>
             <a:endParaRPr lang="en-US" dirty="0"/>
           </a:p>
@@ -2876,7 +2874,7 @@
           <a:p>
             <a:fld id="{4509A250-FF31-4206-8172-F9D3106AACB1}" type="datetimeFigureOut">
               <a:rPr lang="en-US" dirty="0"/>
-              <a:t>10/7/2022</a:t>
+              <a:t>10/17/2022</a:t>
             </a:fld>
             <a:endParaRPr lang="en-US" dirty="0"/>
           </a:p>
@@ -3046,7 +3044,7 @@
           <a:p>
             <a:fld id="{4509A250-FF31-4206-8172-F9D3106AACB1}" type="datetimeFigureOut">
               <a:rPr lang="en-US" dirty="0"/>
-              <a:t>10/7/2022</a:t>
+              <a:t>10/17/2022</a:t>
             </a:fld>
             <a:endParaRPr lang="en-US" dirty="0"/>
           </a:p>
@@ -3226,7 +3224,7 @@
           <a:p>
             <a:fld id="{4509A250-FF31-4206-8172-F9D3106AACB1}" type="datetimeFigureOut">
               <a:rPr lang="en-US" dirty="0"/>
-              <a:t>10/7/2022</a:t>
+              <a:t>10/17/2022</a:t>
             </a:fld>
             <a:endParaRPr lang="en-US" dirty="0"/>
           </a:p>
@@ -3489,7 +3487,7 @@
           <a:p>
             <a:fld id="{4509A250-FF31-4206-8172-F9D3106AACB1}" type="datetimeFigureOut">
               <a:rPr lang="en-US" dirty="0"/>
-              <a:t>10/7/2022</a:t>
+              <a:t>10/17/2022</a:t>
             </a:fld>
             <a:endParaRPr lang="en-US" dirty="0"/>
           </a:p>
@@ -3736,7 +3734,7 @@
           <a:p>
             <a:fld id="{9796027F-7875-4030-9381-8BD8C4F21935}" type="datetimeFigureOut">
               <a:rPr lang="en-US" dirty="0"/>
-              <a:t>10/7/2022</a:t>
+              <a:t>10/17/2022</a:t>
             </a:fld>
             <a:endParaRPr lang="en-US" dirty="0"/>
           </a:p>
@@ -4028,7 +4026,7 @@
           <a:p>
             <a:fld id="{9796027F-7875-4030-9381-8BD8C4F21935}" type="datetimeFigureOut">
               <a:rPr lang="en-US" dirty="0"/>
-              <a:t>10/7/2022</a:t>
+              <a:t>10/17/2022</a:t>
             </a:fld>
             <a:endParaRPr lang="en-US" dirty="0"/>
           </a:p>
@@ -4472,7 +4470,7 @@
           <a:p>
             <a:fld id="{9796027F-7875-4030-9381-8BD8C4F21935}" type="datetimeFigureOut">
               <a:rPr lang="en-US" dirty="0"/>
-              <a:t>10/7/2022</a:t>
+              <a:t>10/17/2022</a:t>
             </a:fld>
             <a:endParaRPr lang="en-US" dirty="0"/>
           </a:p>
@@ -4590,7 +4588,7 @@
           <a:p>
             <a:fld id="{4509A250-FF31-4206-8172-F9D3106AACB1}" type="datetimeFigureOut">
               <a:rPr lang="en-US" dirty="0"/>
-              <a:t>10/7/2022</a:t>
+              <a:t>10/17/2022</a:t>
             </a:fld>
             <a:endParaRPr lang="en-US" dirty="0"/>
           </a:p>
@@ -4685,7 +4683,7 @@
           <a:p>
             <a:fld id="{4509A250-FF31-4206-8172-F9D3106AACB1}" type="datetimeFigureOut">
               <a:rPr lang="en-US" dirty="0"/>
-              <a:t>10/7/2022</a:t>
+              <a:t>10/17/2022</a:t>
             </a:fld>
             <a:endParaRPr lang="en-US" dirty="0"/>
           </a:p>
@@ -4964,7 +4962,7 @@
           <a:p>
             <a:fld id="{4509A250-FF31-4206-8172-F9D3106AACB1}" type="datetimeFigureOut">
               <a:rPr lang="en-US" dirty="0"/>
-              <a:t>10/7/2022</a:t>
+              <a:t>10/17/2022</a:t>
             </a:fld>
             <a:endParaRPr lang="en-US" dirty="0"/>
           </a:p>
@@ -5239,7 +5237,7 @@
           <a:p>
             <a:fld id="{4509A250-FF31-4206-8172-F9D3106AACB1}" type="datetimeFigureOut">
               <a:rPr lang="en-US" dirty="0"/>
-              <a:t>10/7/2022</a:t>
+              <a:t>10/17/2022</a:t>
             </a:fld>
             <a:endParaRPr lang="en-US" dirty="0"/>
           </a:p>
@@ -5668,7 +5666,7 @@
           <a:p>
             <a:fld id="{4AAD347D-5ACD-4C99-B74B-A9C85AD731AF}" type="datetimeFigureOut">
               <a:rPr lang="en-US" dirty="0"/>
-              <a:t>10/7/2022</a:t>
+              <a:t>10/17/2022</a:t>
             </a:fld>
             <a:endParaRPr lang="en-US" dirty="0"/>
           </a:p>
@@ -6540,13 +6538,22 @@
               <a:buChar char=""/>
             </a:pPr>
             <a:r>
+              <a:rPr lang="en-GB" sz="2000" spc="-1" dirty="0">
+                <a:solidFill>
+                  <a:srgbClr val="FFFFFF"/>
+                </a:solidFill>
+                <a:latin typeface="Century Gothic"/>
+              </a:rPr>
+              <a:t>It i</a:t>
+            </a:r>
+            <a:r>
               <a:rPr lang="en-GB" sz="2000" b="0" strike="noStrike" spc="-1" dirty="0">
                 <a:solidFill>
                   <a:srgbClr val="FFFFFF"/>
                 </a:solidFill>
                 <a:latin typeface="Century Gothic"/>
               </a:rPr>
-              <a:t>Is a tool to send email through CLI</a:t>
+              <a:t>s a tool to send email through CLI</a:t>
             </a:r>
             <a:endParaRPr lang="en-US" sz="2000" b="0" strike="noStrike" spc="-1" dirty="0">
               <a:latin typeface="Arial"/>
@@ -6760,8 +6767,8 @@
         </p:nvSpPr>
         <p:spPr>
           <a:xfrm>
-            <a:off x="1103400" y="2053080"/>
-            <a:ext cx="10037520" cy="4194720"/>
+            <a:off x="1103400" y="1501540"/>
+            <a:ext cx="10037520" cy="4746259"/>
           </a:xfrm>
           <a:prstGeom prst="rect">
             <a:avLst/>
@@ -6828,7 +6835,25 @@
                 </a:solidFill>
                 <a:latin typeface="Century Gothic"/>
               </a:rPr>
-              <a:t> Steghide.pdf on </a:t>
+              <a:t> </a:t>
+            </a:r>
+            <a:r>
+              <a:rPr lang="it-IT" sz="2000" b="1" strike="noStrike" spc="-1" dirty="0">
+                <a:solidFill>
+                  <a:srgbClr val="FFFFFF"/>
+                </a:solidFill>
+                <a:latin typeface="Century Gothic"/>
+              </a:rPr>
+              <a:t>Steghide.pdf</a:t>
+            </a:r>
+            <a:r>
+              <a:rPr lang="it-IT" sz="2000" b="0" strike="noStrike" spc="-1" dirty="0">
+                <a:solidFill>
+                  <a:srgbClr val="FFFFFF"/>
+                </a:solidFill>
+                <a:latin typeface="Century Gothic"/>
+              </a:rPr>
+              <a:t> on </a:t>
             </a:r>
             <a:r>
               <a:rPr lang="en-GB" sz="2000" b="0" strike="noStrike" spc="-1" dirty="0">
@@ -6887,7 +6912,7 @@
                 </a:solidFill>
                 <a:latin typeface="Century Gothic"/>
               </a:rPr>
-              <a:t>Build Run steghide.py and </a:t>
+              <a:t>Build and </a:t>
             </a:r>
             <a:r>
               <a:rPr lang="it-IT" sz="2000" b="0" strike="noStrike" spc="-1" dirty="0" err="1">
@@ -6896,7 +6921,7 @@
                 </a:solidFill>
                 <a:latin typeface="Century Gothic"/>
               </a:rPr>
-              <a:t>see</a:t>
+              <a:t>execute</a:t>
             </a:r>
             <a:r>
               <a:rPr lang="it-IT" sz="2000" b="0" strike="noStrike" spc="-1" dirty="0">
@@ -6908,13 +6933,13 @@
               <a:t> </a:t>
             </a:r>
             <a:r>
-              <a:rPr lang="it-IT" sz="2000" b="0" strike="noStrike" spc="-1" dirty="0" err="1">
-                <a:solidFill>
-                  <a:srgbClr val="FFFFFF"/>
-                </a:solidFill>
-                <a:latin typeface="Century Gothic"/>
-              </a:rPr>
-              <a:t>what’s</a:t>
+              <a:rPr lang="it-IT" sz="2000" b="1" strike="noStrike" spc="-1" dirty="0">
+                <a:solidFill>
+                  <a:srgbClr val="FFFFFF"/>
+                </a:solidFill>
+                <a:latin typeface="Century Gothic"/>
+              </a:rPr>
+              <a:t>steghide.py</a:t>
             </a:r>
             <a:r>
               <a:rPr lang="it-IT" sz="2000" b="0" strike="noStrike" spc="-1" dirty="0">
@@ -6925,80 +6950,6 @@
               </a:rPr>
               <a:t> </a:t>
             </a:r>
-            <a:r>
-              <a:rPr lang="it-IT" sz="2000" b="0" strike="noStrike" spc="-1" dirty="0" err="1">
-                <a:solidFill>
-                  <a:srgbClr val="FFFFFF"/>
-                </a:solidFill>
-                <a:latin typeface="Century Gothic"/>
-              </a:rPr>
-              <a:t>going</a:t>
-            </a:r>
-            <a:r>
-              <a:rPr lang="it-IT" sz="2000" b="0" strike="noStrike" spc="-1" dirty="0">
-                <a:solidFill>
-                  <a:srgbClr val="FFFFFF"/>
-                </a:solidFill>
-                <a:latin typeface="Century Gothic"/>
-              </a:rPr>
-              <a:t> on </a:t>
-            </a:r>
-            <a:r>
-              <a:rPr lang="it-IT" sz="2000" b="0" strike="noStrike" spc="-1" dirty="0" err="1">
-                <a:solidFill>
-                  <a:srgbClr val="FFFFFF"/>
-                </a:solidFill>
-                <a:latin typeface="Century Gothic"/>
-              </a:rPr>
-              <a:t>on</a:t>
-            </a:r>
-            <a:r>
-              <a:rPr lang="it-IT" sz="2000" b="0" strike="noStrike" spc="-1" dirty="0">
-                <a:solidFill>
-                  <a:srgbClr val="FFFFFF"/>
-                </a:solidFill>
-                <a:latin typeface="Century Gothic"/>
-              </a:rPr>
-              <a:t> </a:t>
-            </a:r>
-            <a:r>
-              <a:rPr lang="it-IT" sz="2000" b="0" strike="noStrike" spc="-1" dirty="0" err="1">
-                <a:solidFill>
-                  <a:srgbClr val="FFFFFF"/>
-                </a:solidFill>
-                <a:latin typeface="Century Gothic"/>
-              </a:rPr>
-              <a:t>wireshark</a:t>
-            </a:r>
-            <a:endParaRPr lang="en-US" sz="2000" b="0" strike="noStrike" spc="-1" dirty="0">
-              <a:latin typeface="Arial"/>
-            </a:endParaRPr>
-          </a:p>
-          <a:p>
-            <a:pPr>
-              <a:lnSpc>
-                <a:spcPct val="100000"/>
-              </a:lnSpc>
-              <a:spcBef>
-                <a:spcPts val="1001"/>
-              </a:spcBef>
-            </a:pPr>
-            <a:endParaRPr lang="en-US" sz="2000" b="0" strike="noStrike" spc="-1" dirty="0">
-              <a:latin typeface="Arial"/>
-            </a:endParaRPr>
-          </a:p>
-          <a:p>
-            <a:pPr>
-              <a:lnSpc>
-                <a:spcPct val="100000"/>
-              </a:lnSpc>
-              <a:spcBef>
-                <a:spcPts val="1001"/>
-              </a:spcBef>
-            </a:pPr>
-            <a:endParaRPr lang="en-US" sz="2000" b="0" strike="noStrike" spc="-1" dirty="0">
-              <a:latin typeface="Arial"/>
-            </a:endParaRPr>
           </a:p>
           <a:p>
             <a:pPr marL="343080" indent="-342360">
@@ -7015,6 +6966,123 @@
               <a:buFont typeface="Wingdings 3" charset="2"/>
               <a:buChar char=""/>
             </a:pPr>
+            <a:endParaRPr lang="it-IT" sz="2000" spc="-1" dirty="0">
+              <a:solidFill>
+                <a:srgbClr val="FFFFFF"/>
+              </a:solidFill>
+              <a:latin typeface="Century Gothic"/>
+            </a:endParaRPr>
+          </a:p>
+          <a:p>
+            <a:pPr marL="343080" indent="-342360">
+              <a:lnSpc>
+                <a:spcPct val="100000"/>
+              </a:lnSpc>
+              <a:spcBef>
+                <a:spcPts val="1001"/>
+              </a:spcBef>
+              <a:buClr>
+                <a:srgbClr val="8AD0D6"/>
+              </a:buClr>
+              <a:buSzPct val="80000"/>
+              <a:buFont typeface="Wingdings 3" charset="2"/>
+              <a:buChar char=""/>
+            </a:pPr>
+            <a:r>
+              <a:rPr lang="it-IT" sz="2000" b="0" strike="noStrike" spc="-1" dirty="0">
+                <a:solidFill>
+                  <a:srgbClr val="FFFFFF"/>
+                </a:solidFill>
+                <a:latin typeface="Century Gothic"/>
+              </a:rPr>
+              <a:t>Capture the </a:t>
+            </a:r>
+            <a:r>
+              <a:rPr lang="it-IT" sz="2000" b="0" strike="noStrike" spc="-1" dirty="0" err="1">
+                <a:solidFill>
+                  <a:srgbClr val="FFFFFF"/>
+                </a:solidFill>
+                <a:latin typeface="Century Gothic"/>
+              </a:rPr>
+              <a:t>traffic</a:t>
+            </a:r>
+            <a:r>
+              <a:rPr lang="it-IT" sz="2000" b="0" strike="noStrike" spc="-1" dirty="0">
+                <a:solidFill>
+                  <a:srgbClr val="FFFFFF"/>
+                </a:solidFill>
+                <a:latin typeface="Century Gothic"/>
+              </a:rPr>
+              <a:t> </a:t>
+            </a:r>
+            <a:r>
+              <a:rPr lang="it-IT" sz="2000" b="0" strike="noStrike" spc="-1" dirty="0" err="1">
+                <a:solidFill>
+                  <a:srgbClr val="FFFFFF"/>
+                </a:solidFill>
+                <a:latin typeface="Century Gothic"/>
+              </a:rPr>
+              <a:t>using</a:t>
+            </a:r>
+            <a:r>
+              <a:rPr lang="it-IT" sz="2000" b="0" strike="noStrike" spc="-1" dirty="0">
+                <a:solidFill>
+                  <a:srgbClr val="FFFFFF"/>
+                </a:solidFill>
+                <a:latin typeface="Century Gothic"/>
+              </a:rPr>
+              <a:t> </a:t>
+            </a:r>
+            <a:r>
+              <a:rPr lang="it-IT" sz="2000" b="0" strike="noStrike" spc="-1" dirty="0" err="1">
+                <a:solidFill>
+                  <a:srgbClr val="FFFFFF"/>
+                </a:solidFill>
+                <a:latin typeface="Century Gothic"/>
+              </a:rPr>
+              <a:t>wireshark</a:t>
+            </a:r>
+            <a:endParaRPr lang="it-IT" sz="2000" b="0" strike="noStrike" spc="-1" dirty="0">
+              <a:solidFill>
+                <a:srgbClr val="FFFFFF"/>
+              </a:solidFill>
+              <a:latin typeface="Century Gothic"/>
+            </a:endParaRPr>
+          </a:p>
+          <a:p>
+            <a:pPr marL="343080" indent="-342360">
+              <a:lnSpc>
+                <a:spcPct val="100000"/>
+              </a:lnSpc>
+              <a:spcBef>
+                <a:spcPts val="1001"/>
+              </a:spcBef>
+              <a:buClr>
+                <a:srgbClr val="8AD0D6"/>
+              </a:buClr>
+              <a:buSzPct val="80000"/>
+              <a:buFont typeface="Wingdings 3" charset="2"/>
+              <a:buChar char=""/>
+            </a:pPr>
+            <a:endParaRPr lang="en-US" sz="2000" b="0" strike="noStrike" spc="-1" dirty="0">
+              <a:latin typeface="Arial"/>
+            </a:endParaRPr>
+          </a:p>
+          <a:p>
+            <a:pPr marL="343080" indent="-342360">
+              <a:lnSpc>
+                <a:spcPct val="100000"/>
+              </a:lnSpc>
+              <a:spcBef>
+                <a:spcPts val="1001"/>
+              </a:spcBef>
+              <a:buClr>
+                <a:srgbClr val="8AD0D6"/>
+              </a:buClr>
+              <a:buSzPct val="80000"/>
+              <a:buFont typeface="Wingdings 3" charset="2"/>
+              <a:buChar char=""/>
+            </a:pPr>
             <a:r>
               <a:rPr lang="it-IT" sz="2000" b="0" strike="noStrike" spc="-1" dirty="0" err="1">
                 <a:solidFill>
@@ -7339,181 +7407,6 @@
               </a:spcBef>
             </a:pPr>
             <a:endParaRPr lang="en-US" sz="1600" b="0" strike="noStrike" spc="-1" dirty="0">
-              <a:latin typeface="Arial"/>
-            </a:endParaRPr>
-          </a:p>
-        </p:txBody>
-      </p:sp>
-    </p:spTree>
-  </p:cSld>
-  <p:clrMapOvr>
-    <a:masterClrMapping/>
-  </p:clrMapOvr>
-</p:sld>
-</file>
-
-<file path=ppt/slides/slide12.xml><?xml version="1.0" encoding="utf-8"?>
-<p:sld xmlns:a="http://schemas.openxmlformats.org/drawingml/2006/main" xmlns:r="http://schemas.openxmlformats.org/officeDocument/2006/relationships" xmlns:p="http://schemas.openxmlformats.org/presentationml/2006/main">
-  <p:cSld>
-    <p:spTree>
-      <p:nvGrpSpPr>
-        <p:cNvPr id="1" name=""/>
-        <p:cNvGrpSpPr/>
-        <p:nvPr/>
-      </p:nvGrpSpPr>
-      <p:grpSpPr>
-        <a:xfrm>
-          <a:off x="0" y="0"/>
-          <a:ext cx="0" cy="0"/>
-          <a:chOff x="0" y="0"/>
-          <a:chExt cx="0" cy="0"/>
-        </a:xfrm>
-      </p:grpSpPr>
-      <p:sp>
-        <p:nvSpPr>
-          <p:cNvPr id="113" name="CustomShape 1"/>
-          <p:cNvSpPr/>
-          <p:nvPr/>
-        </p:nvSpPr>
-        <p:spPr>
-          <a:xfrm>
-            <a:off x="4099680" y="2734200"/>
-            <a:ext cx="4155840" cy="878040"/>
-          </a:xfrm>
-          <a:prstGeom prst="rect">
-            <a:avLst/>
-          </a:prstGeom>
-          <a:noFill/>
-          <a:ln>
-            <a:noFill/>
-          </a:ln>
-        </p:spPr>
-        <p:style>
-          <a:lnRef idx="0">
-            <a:scrgbClr r="0" g="0" b="0"/>
-          </a:lnRef>
-          <a:fillRef idx="0">
-            <a:scrgbClr r="0" g="0" b="0"/>
-          </a:fillRef>
-          <a:effectRef idx="0">
-            <a:scrgbClr r="0" g="0" b="0"/>
-          </a:effectRef>
-          <a:fontRef idx="minor"/>
-        </p:style>
-        <p:txBody>
-          <a:bodyPr lIns="90000" tIns="45000" rIns="90000" bIns="45000">
-            <a:noAutofit/>
-          </a:bodyPr>
-          <a:lstStyle/>
-          <a:p>
-            <a:pPr>
-              <a:lnSpc>
-                <a:spcPct val="100000"/>
-              </a:lnSpc>
-            </a:pPr>
-            <a:r>
-              <a:rPr lang="en-GB" sz="4200" b="0" strike="noStrike" spc="-1">
-                <a:solidFill>
-                  <a:srgbClr val="EBEBEB"/>
-                </a:solidFill>
-                <a:latin typeface="Century Gothic"/>
-              </a:rPr>
-              <a:t>Questions?</a:t>
-            </a:r>
-            <a:endParaRPr lang="en-US" sz="4200" b="0" strike="noStrike" spc="-1">
-              <a:latin typeface="Arial"/>
-            </a:endParaRPr>
-          </a:p>
-        </p:txBody>
-      </p:sp>
-    </p:spTree>
-  </p:cSld>
-  <p:clrMapOvr>
-    <a:masterClrMapping/>
-  </p:clrMapOvr>
-</p:sld>
-</file>
-
-<file path=ppt/slides/slide13.xml><?xml version="1.0" encoding="utf-8"?>
-<p:sld xmlns:a="http://schemas.openxmlformats.org/drawingml/2006/main" xmlns:r="http://schemas.openxmlformats.org/officeDocument/2006/relationships" xmlns:p="http://schemas.openxmlformats.org/presentationml/2006/main">
-  <p:cSld>
-    <p:spTree>
-      <p:nvGrpSpPr>
-        <p:cNvPr id="1" name=""/>
-        <p:cNvGrpSpPr/>
-        <p:nvPr/>
-      </p:nvGrpSpPr>
-      <p:grpSpPr>
-        <a:xfrm>
-          <a:off x="0" y="0"/>
-          <a:ext cx="0" cy="0"/>
-          <a:chOff x="0" y="0"/>
-          <a:chExt cx="0" cy="0"/>
-        </a:xfrm>
-      </p:grpSpPr>
-      <p:sp>
-        <p:nvSpPr>
-          <p:cNvPr id="114" name="CustomShape 1"/>
-          <p:cNvSpPr/>
-          <p:nvPr/>
-        </p:nvSpPr>
-        <p:spPr>
-          <a:xfrm>
-            <a:off x="983520" y="2592360"/>
-            <a:ext cx="10192680" cy="2849040"/>
-          </a:xfrm>
-          <a:prstGeom prst="rect">
-            <a:avLst/>
-          </a:prstGeom>
-          <a:noFill/>
-          <a:ln>
-            <a:noFill/>
-          </a:ln>
-        </p:spPr>
-        <p:style>
-          <a:lnRef idx="0">
-            <a:scrgbClr r="0" g="0" b="0"/>
-          </a:lnRef>
-          <a:fillRef idx="0">
-            <a:scrgbClr r="0" g="0" b="0"/>
-          </a:fillRef>
-          <a:effectRef idx="0">
-            <a:scrgbClr r="0" g="0" b="0"/>
-          </a:effectRef>
-          <a:fontRef idx="minor"/>
-        </p:style>
-        <p:txBody>
-          <a:bodyPr lIns="90000" tIns="45000" rIns="90000" bIns="45000">
-            <a:noAutofit/>
-          </a:bodyPr>
-          <a:lstStyle/>
-          <a:p>
-            <a:pPr>
-              <a:lnSpc>
-                <a:spcPct val="100000"/>
-              </a:lnSpc>
-            </a:pPr>
-            <a:r>
-              <a:rPr lang="en-GB" sz="4200" b="0" strike="noStrike" spc="-1">
-                <a:solidFill>
-                  <a:srgbClr val="EBEBEB"/>
-                </a:solidFill>
-                <a:latin typeface="Century Gothic"/>
-              </a:rPr>
-              <a:t>The lesson is over.</a:t>
-            </a:r>
-            <a:br/>
-            <a:br/>
-            <a:r>
-              <a:rPr lang="en-GB" sz="4200" b="0" strike="noStrike" spc="-1">
-                <a:solidFill>
-                  <a:srgbClr val="EBEBEB"/>
-                </a:solidFill>
-                <a:latin typeface="Century Gothic"/>
-              </a:rPr>
-              <a:t>Thank you! </a:t>
-            </a:r>
-            <a:endParaRPr lang="en-US" sz="4200" b="0" strike="noStrike" spc="-1">
               <a:latin typeface="Arial"/>
             </a:endParaRPr>
           </a:p>
@@ -8120,7 +8013,7 @@
                   <a:srgbClr val="FFFFFF"/>
                 </a:solidFill>
               </a:rPr>
-              <a:t>data between two computer networks</a:t>
+              <a:t>data between two computer in the networks</a:t>
             </a:r>
           </a:p>
           <a:p>
@@ -8373,23 +8266,7 @@
                   <a:srgbClr val="FFFFFF"/>
                 </a:solidFill>
               </a:rPr>
-              <a:t>We will use </a:t>
-            </a:r>
-            <a:r>
-              <a:rPr lang="en-US" sz="2000" spc="-1" dirty="0" err="1">
-                <a:solidFill>
-                  <a:srgbClr val="FFFFFF"/>
-                </a:solidFill>
-              </a:rPr>
-              <a:t>netcat</a:t>
-            </a:r>
-            <a:r>
-              <a:rPr lang="en-US" sz="2000" spc="-1" dirty="0">
-                <a:solidFill>
-                  <a:srgbClr val="FFFFFF"/>
-                </a:solidFill>
-              </a:rPr>
-              <a:t> in our laboratory session to exchange encrypted messages between 2 hosts</a:t>
+              <a:t>It will be used to exchange encrypted messages between 2 hosts</a:t>
             </a:r>
           </a:p>
           <a:p>
@@ -8552,7 +8429,7 @@
                   <a:srgbClr val="FFFFFF"/>
                 </a:solidFill>
               </a:rPr>
-              <a:t>It allows to encrypted or decrypted data using various block and stream ciphers using keys based on passwords or explicitly provided</a:t>
+              <a:t>It allows to encrypt or decrypt data using various block and stream ciphers, keys based on passwords or explicitly provided</a:t>
             </a:r>
             <a:endParaRPr lang="en-US" sz="2000" b="0" strike="noStrike" spc="-1" dirty="0">
               <a:latin typeface="Arial"/>
@@ -8881,7 +8758,7 @@
                   <a:srgbClr val="FFFFFF"/>
                 </a:solidFill>
               </a:rPr>
-              <a:t>We will use OpenSSL Enc in our laboratory session to encrypt and decrypt data sent/received by hosts</a:t>
+              <a:t>It will be used to encrypt and decrypt data sent/received by hosts</a:t>
             </a:r>
           </a:p>
           <a:p>
@@ -8994,7 +8871,7 @@
         <p:spPr>
           <a:xfrm>
             <a:off x="1103400" y="1253836"/>
-            <a:ext cx="9512640" cy="4993964"/>
+            <a:ext cx="10442400" cy="4993964"/>
           </a:xfrm>
           <a:prstGeom prst="rect">
             <a:avLst/>
@@ -9504,34 +9381,7 @@
                 </a:solidFill>
                 <a:latin typeface="Century Gothic"/>
               </a:rPr>
-              <a:t>Useful</a:t>
-            </a:r>
-            <a:r>
-              <a:rPr lang="it-IT" sz="2000" b="0" strike="noStrike" spc="-1" dirty="0">
-                <a:solidFill>
-                  <a:srgbClr val="FFFFFF"/>
-                </a:solidFill>
-                <a:latin typeface="Century Gothic"/>
-              </a:rPr>
-              <a:t> </a:t>
-            </a:r>
-            <a:r>
-              <a:rPr lang="it-IT" sz="2000" b="0" strike="noStrike" spc="-1" dirty="0" err="1">
-                <a:solidFill>
-                  <a:srgbClr val="FFFFFF"/>
-                </a:solidFill>
-                <a:latin typeface="Century Gothic"/>
-              </a:rPr>
-              <a:t>commands</a:t>
-            </a:r>
-            <a:r>
-              <a:rPr lang="it-IT" sz="2000" b="0" strike="noStrike" spc="-1" dirty="0">
-                <a:solidFill>
-                  <a:srgbClr val="FFFFFF"/>
-                </a:solidFill>
-                <a:latin typeface="Century Gothic"/>
-              </a:rPr>
-              <a:t>:</a:t>
+              <a:t>Hint</a:t>
             </a:r>
             <a:endParaRPr lang="en-US" sz="2000" b="0" strike="noStrike" spc="-1" dirty="0">
               <a:latin typeface="Arial"/>
@@ -9649,7 +9499,25 @@
                 </a:solidFill>
                 <a:latin typeface="Century Gothic"/>
               </a:rPr>
-              <a:t> use </a:t>
+              <a:t> </a:t>
+            </a:r>
+            <a:r>
+              <a:rPr lang="it-IT" sz="1800" b="0" strike="noStrike" spc="-1" dirty="0" err="1">
+                <a:solidFill>
+                  <a:srgbClr val="FFFFFF"/>
+                </a:solidFill>
+                <a:latin typeface="Century Gothic"/>
+              </a:rPr>
+              <a:t>you</a:t>
+            </a:r>
+            <a:r>
+              <a:rPr lang="it-IT" sz="1800" b="0" strike="noStrike" spc="-1" dirty="0">
+                <a:solidFill>
+                  <a:srgbClr val="FFFFFF"/>
+                </a:solidFill>
+                <a:latin typeface="Century Gothic"/>
+              </a:rPr>
+              <a:t> can use </a:t>
             </a:r>
             <a:r>
               <a:rPr lang="it-IT" sz="1800" b="1" strike="noStrike" spc="-1" dirty="0" err="1">
@@ -9794,7 +9662,7 @@
                 </a:solidFill>
                 <a:latin typeface="Century Gothic"/>
               </a:rPr>
-              <a:t>But… how can we build an encrypted stream?</a:t>
+              <a:t>How to build an encrypted stream?</a:t>
             </a:r>
             <a:endParaRPr lang="en-US" sz="4200" b="0" strike="noStrike" spc="-1" dirty="0">
               <a:latin typeface="Arial"/>
@@ -10040,11 +9908,8 @@
             </a:pPr>
             <a:r>
               <a:rPr lang="en-US" sz="2000" dirty="0"/>
-              <a:t>It is a simple Unix utility which reads and writes data across network connections, using TCP or UDP protocol while encrypting the data being transmitted</a:t>
-            </a:r>
-            <a:endParaRPr lang="en-US" sz="2000" b="0" strike="noStrike" spc="-1" dirty="0">
-              <a:latin typeface="Arial"/>
-            </a:endParaRPr>
+              <a:t>It is a simple Unix utility which reads and writes data across network connections</a:t>
+            </a:r>
           </a:p>
           <a:p>
             <a:pPr marL="343080" indent="-342360">
@@ -10062,13 +9927,101 @@
               <a:buChar char=""/>
             </a:pPr>
             <a:r>
+              <a:rPr lang="en-US" sz="2000" dirty="0"/>
+              <a:t>It makes use of TCP or UDP protocols</a:t>
+            </a:r>
+          </a:p>
+          <a:p>
+            <a:pPr marL="343080" indent="-342360">
+              <a:lnSpc>
+                <a:spcPct val="100000"/>
+              </a:lnSpc>
+              <a:spcBef>
+                <a:spcPts val="1001"/>
+              </a:spcBef>
+              <a:buClr>
+                <a:srgbClr val="8AD0D6"/>
+              </a:buClr>
+              <a:buSzPct val="80000"/>
+              <a:buFont typeface="Wingdings 3" charset="2"/>
+              <a:buChar char=""/>
+            </a:pPr>
+            <a:r>
+              <a:rPr lang="en-US" sz="2000" dirty="0"/>
+              <a:t>It encrypts the data before transmission</a:t>
+            </a:r>
+            <a:endParaRPr lang="en-US" sz="2000" b="0" strike="noStrike" spc="-1" dirty="0">
+              <a:latin typeface="Arial"/>
+            </a:endParaRPr>
+          </a:p>
+          <a:p>
+            <a:pPr marL="343080" indent="-342360">
+              <a:lnSpc>
+                <a:spcPct val="100000"/>
+              </a:lnSpc>
+              <a:spcBef>
+                <a:spcPts val="1001"/>
+              </a:spcBef>
+              <a:buClr>
+                <a:srgbClr val="8AD0D6"/>
+              </a:buClr>
+              <a:buSzPct val="80000"/>
+              <a:buFont typeface="Wingdings 3" charset="2"/>
+              <a:buChar char=""/>
+            </a:pPr>
+            <a:r>
               <a:rPr lang="it-IT" sz="2000" b="0" strike="noStrike" spc="-1" dirty="0" err="1">
                 <a:solidFill>
                   <a:srgbClr val="FFFFFF"/>
                 </a:solidFill>
                 <a:latin typeface="Century Gothic"/>
               </a:rPr>
-              <a:t>Based</a:t>
+              <a:t>It</a:t>
+            </a:r>
+            <a:r>
+              <a:rPr lang="it-IT" sz="2000" b="0" strike="noStrike" spc="-1" dirty="0">
+                <a:solidFill>
+                  <a:srgbClr val="FFFFFF"/>
+                </a:solidFill>
+                <a:latin typeface="Century Gothic"/>
+              </a:rPr>
+              <a:t> </a:t>
+            </a:r>
+            <a:r>
+              <a:rPr lang="it-IT" sz="2000" spc="-1" dirty="0" err="1">
+                <a:solidFill>
+                  <a:srgbClr val="FFFFFF"/>
+                </a:solidFill>
+                <a:latin typeface="Century Gothic"/>
+              </a:rPr>
+              <a:t>is</a:t>
+            </a:r>
+            <a:r>
+              <a:rPr lang="it-IT" sz="2000" spc="-1" dirty="0">
+                <a:solidFill>
+                  <a:srgbClr val="FFFFFF"/>
+                </a:solidFill>
+                <a:latin typeface="Century Gothic"/>
+              </a:rPr>
+              <a:t> </a:t>
+            </a:r>
+            <a:r>
+              <a:rPr lang="it-IT" sz="2000" spc="-1" dirty="0" err="1">
+                <a:solidFill>
+                  <a:srgbClr val="FFFFFF"/>
+                </a:solidFill>
+                <a:latin typeface="Century Gothic"/>
+              </a:rPr>
+              <a:t>b</a:t>
+            </a:r>
+            <a:r>
+              <a:rPr lang="it-IT" sz="2000" b="0" strike="noStrike" spc="-1" dirty="0" err="1">
+                <a:solidFill>
+                  <a:srgbClr val="FFFFFF"/>
+                </a:solidFill>
+                <a:latin typeface="Century Gothic"/>
+              </a:rPr>
+              <a:t>ased</a:t>
             </a:r>
             <a:r>
               <a:rPr lang="it-IT" sz="2000" b="0" strike="noStrike" spc="-1" dirty="0">
@@ -10883,25 +10836,7 @@
                 </a:solidFill>
                 <a:latin typeface="Century Gothic"/>
               </a:rPr>
-              <a:t> on the </a:t>
-            </a:r>
-            <a:r>
-              <a:rPr lang="it-IT" sz="2000" b="0" strike="noStrike" spc="-1" dirty="0" err="1">
-                <a:solidFill>
-                  <a:srgbClr val="FFFFFF"/>
-                </a:solidFill>
-                <a:latin typeface="Century Gothic"/>
-              </a:rPr>
-              <a:t>websiteand</a:t>
-            </a:r>
-            <a:r>
-              <a:rPr lang="it-IT" sz="2000" b="0" strike="noStrike" spc="-1" dirty="0">
-                <a:solidFill>
-                  <a:srgbClr val="FFFFFF"/>
-                </a:solidFill>
-                <a:latin typeface="Century Gothic"/>
-              </a:rPr>
-              <a:t> follow the guide</a:t>
+              <a:t> on the website and follow the guide</a:t>
             </a:r>
             <a:endParaRPr lang="en-US" sz="2000" b="0" strike="noStrike" spc="-1" dirty="0">
               <a:latin typeface="Arial"/>

</xml_diff>

<commit_message>
rewritten slides and guides for wep crack
</commit_message>
<xml_diff>
--- a/esercitazioni/Laboratory_22-23/Session_2/Lab_02_Slides.pptx
+++ b/esercitazioni/Laboratory_22-23/Session_2/Lab_02_Slides.pptx
@@ -308,7 +308,7 @@
           <a:p>
             <a:fld id="{4AAD347D-5ACD-4C99-B74B-A9C85AD731AF}" type="datetimeFigureOut">
               <a:rPr lang="en-US" dirty="0"/>
-              <a:t>10/17/2022</a:t>
+              <a:t>11/14/2022</a:t>
             </a:fld>
             <a:endParaRPr lang="en-US" dirty="0"/>
           </a:p>
@@ -583,7 +583,7 @@
           <a:p>
             <a:fld id="{4509A250-FF31-4206-8172-F9D3106AACB1}" type="datetimeFigureOut">
               <a:rPr lang="en-US" dirty="0"/>
-              <a:t>10/17/2022</a:t>
+              <a:t>11/14/2022</a:t>
             </a:fld>
             <a:endParaRPr lang="en-US" dirty="0"/>
           </a:p>
@@ -777,7 +777,7 @@
           <a:p>
             <a:fld id="{4509A250-FF31-4206-8172-F9D3106AACB1}" type="datetimeFigureOut">
               <a:rPr lang="en-US" dirty="0"/>
-              <a:t>10/17/2022</a:t>
+              <a:t>11/14/2022</a:t>
             </a:fld>
             <a:endParaRPr lang="en-US" dirty="0"/>
           </a:p>
@@ -1050,7 +1050,7 @@
           <a:p>
             <a:fld id="{4509A250-FF31-4206-8172-F9D3106AACB1}" type="datetimeFigureOut">
               <a:rPr lang="en-US" dirty="0"/>
-              <a:t>10/17/2022</a:t>
+              <a:t>11/14/2022</a:t>
             </a:fld>
             <a:endParaRPr lang="en-US" dirty="0"/>
           </a:p>
@@ -1391,7 +1391,7 @@
           <a:p>
             <a:fld id="{4509A250-FF31-4206-8172-F9D3106AACB1}" type="datetimeFigureOut">
               <a:rPr lang="en-US" dirty="0"/>
-              <a:t>10/17/2022</a:t>
+              <a:t>11/14/2022</a:t>
             </a:fld>
             <a:endParaRPr lang="en-US" dirty="0"/>
           </a:p>
@@ -2014,7 +2014,7 @@
           <a:p>
             <a:fld id="{4509A250-FF31-4206-8172-F9D3106AACB1}" type="datetimeFigureOut">
               <a:rPr lang="en-US" dirty="0"/>
-              <a:t>10/17/2022</a:t>
+              <a:t>11/14/2022</a:t>
             </a:fld>
             <a:endParaRPr lang="en-US" dirty="0"/>
           </a:p>
@@ -2874,7 +2874,7 @@
           <a:p>
             <a:fld id="{4509A250-FF31-4206-8172-F9D3106AACB1}" type="datetimeFigureOut">
               <a:rPr lang="en-US" dirty="0"/>
-              <a:t>10/17/2022</a:t>
+              <a:t>11/14/2022</a:t>
             </a:fld>
             <a:endParaRPr lang="en-US" dirty="0"/>
           </a:p>
@@ -3044,7 +3044,7 @@
           <a:p>
             <a:fld id="{4509A250-FF31-4206-8172-F9D3106AACB1}" type="datetimeFigureOut">
               <a:rPr lang="en-US" dirty="0"/>
-              <a:t>10/17/2022</a:t>
+              <a:t>11/14/2022</a:t>
             </a:fld>
             <a:endParaRPr lang="en-US" dirty="0"/>
           </a:p>
@@ -3224,7 +3224,7 @@
           <a:p>
             <a:fld id="{4509A250-FF31-4206-8172-F9D3106AACB1}" type="datetimeFigureOut">
               <a:rPr lang="en-US" dirty="0"/>
-              <a:t>10/17/2022</a:t>
+              <a:t>11/14/2022</a:t>
             </a:fld>
             <a:endParaRPr lang="en-US" dirty="0"/>
           </a:p>
@@ -3487,7 +3487,7 @@
           <a:p>
             <a:fld id="{4509A250-FF31-4206-8172-F9D3106AACB1}" type="datetimeFigureOut">
               <a:rPr lang="en-US" dirty="0"/>
-              <a:t>10/17/2022</a:t>
+              <a:t>11/14/2022</a:t>
             </a:fld>
             <a:endParaRPr lang="en-US" dirty="0"/>
           </a:p>
@@ -3734,7 +3734,7 @@
           <a:p>
             <a:fld id="{9796027F-7875-4030-9381-8BD8C4F21935}" type="datetimeFigureOut">
               <a:rPr lang="en-US" dirty="0"/>
-              <a:t>10/17/2022</a:t>
+              <a:t>11/14/2022</a:t>
             </a:fld>
             <a:endParaRPr lang="en-US" dirty="0"/>
           </a:p>
@@ -4026,7 +4026,7 @@
           <a:p>
             <a:fld id="{9796027F-7875-4030-9381-8BD8C4F21935}" type="datetimeFigureOut">
               <a:rPr lang="en-US" dirty="0"/>
-              <a:t>10/17/2022</a:t>
+              <a:t>11/14/2022</a:t>
             </a:fld>
             <a:endParaRPr lang="en-US" dirty="0"/>
           </a:p>
@@ -4470,7 +4470,7 @@
           <a:p>
             <a:fld id="{9796027F-7875-4030-9381-8BD8C4F21935}" type="datetimeFigureOut">
               <a:rPr lang="en-US" dirty="0"/>
-              <a:t>10/17/2022</a:t>
+              <a:t>11/14/2022</a:t>
             </a:fld>
             <a:endParaRPr lang="en-US" dirty="0"/>
           </a:p>
@@ -4588,7 +4588,7 @@
           <a:p>
             <a:fld id="{4509A250-FF31-4206-8172-F9D3106AACB1}" type="datetimeFigureOut">
               <a:rPr lang="en-US" dirty="0"/>
-              <a:t>10/17/2022</a:t>
+              <a:t>11/14/2022</a:t>
             </a:fld>
             <a:endParaRPr lang="en-US" dirty="0"/>
           </a:p>
@@ -4683,7 +4683,7 @@
           <a:p>
             <a:fld id="{4509A250-FF31-4206-8172-F9D3106AACB1}" type="datetimeFigureOut">
               <a:rPr lang="en-US" dirty="0"/>
-              <a:t>10/17/2022</a:t>
+              <a:t>11/14/2022</a:t>
             </a:fld>
             <a:endParaRPr lang="en-US" dirty="0"/>
           </a:p>
@@ -4962,7 +4962,7 @@
           <a:p>
             <a:fld id="{4509A250-FF31-4206-8172-F9D3106AACB1}" type="datetimeFigureOut">
               <a:rPr lang="en-US" dirty="0"/>
-              <a:t>10/17/2022</a:t>
+              <a:t>11/14/2022</a:t>
             </a:fld>
             <a:endParaRPr lang="en-US" dirty="0"/>
           </a:p>
@@ -5237,7 +5237,7 @@
           <a:p>
             <a:fld id="{4509A250-FF31-4206-8172-F9D3106AACB1}" type="datetimeFigureOut">
               <a:rPr lang="en-US" dirty="0"/>
-              <a:t>10/17/2022</a:t>
+              <a:t>11/14/2022</a:t>
             </a:fld>
             <a:endParaRPr lang="en-US" dirty="0"/>
           </a:p>
@@ -5666,7 +5666,7 @@
           <a:p>
             <a:fld id="{4AAD347D-5ACD-4C99-B74B-A9C85AD731AF}" type="datetimeFigureOut">
               <a:rPr lang="en-US" dirty="0"/>
-              <a:t>10/17/2022</a:t>
+              <a:t>11/14/2022</a:t>
             </a:fld>
             <a:endParaRPr lang="en-US" dirty="0"/>
           </a:p>
@@ -6238,52 +6238,36 @@
               </a:lnSpc>
             </a:pPr>
             <a:r>
+              <a:rPr lang="it-IT" sz="7200" b="0" strike="noStrike" spc="-1" dirty="0">
+                <a:solidFill>
+                  <a:srgbClr val="EBEBEB"/>
+                </a:solidFill>
+                <a:latin typeface="Century Gothic"/>
+              </a:rPr>
+              <a:t>Network Security</a:t>
+            </a:r>
+            <a:br>
+              <a:rPr dirty="0"/>
+            </a:br>
+            <a:r>
+              <a:rPr lang="en-GB" sz="7200" b="0" strike="noStrike" spc="-1" dirty="0">
+                <a:solidFill>
+                  <a:srgbClr val="EBEBEB"/>
+                </a:solidFill>
+                <a:latin typeface="Century Gothic"/>
+              </a:rPr>
+              <a:t>Laboratory</a:t>
+            </a:r>
+            <a:r>
               <a:rPr lang="it-IT" sz="7200" b="0" strike="noStrike" spc="-1">
                 <a:solidFill>
                   <a:srgbClr val="EBEBEB"/>
                 </a:solidFill>
                 <a:latin typeface="Century Gothic"/>
               </a:rPr>
-              <a:t>Network Security</a:t>
-            </a:r>
-            <a:br/>
-            <a:r>
-              <a:rPr lang="en-GB" sz="7200" b="0" strike="noStrike" spc="-1">
-                <a:solidFill>
-                  <a:srgbClr val="EBEBEB"/>
-                </a:solidFill>
-                <a:latin typeface="Century Gothic"/>
-              </a:rPr>
-              <a:t>Laboratory</a:t>
-            </a:r>
-            <a:r>
-              <a:rPr lang="it-IT" sz="7200" b="0" strike="noStrike" spc="-1">
-                <a:solidFill>
-                  <a:srgbClr val="EBEBEB"/>
-                </a:solidFill>
-                <a:latin typeface="Century Gothic"/>
-              </a:rPr>
-              <a:t> – </a:t>
-            </a:r>
-            <a:r>
-              <a:rPr lang="en-GB" sz="7200" b="0" strike="noStrike" spc="-1">
-                <a:solidFill>
-                  <a:srgbClr val="EBEBEB"/>
-                </a:solidFill>
-                <a:latin typeface="Century Gothic"/>
-              </a:rPr>
-              <a:t>Lecture</a:t>
-            </a:r>
-            <a:r>
-              <a:rPr lang="it-IT" sz="7200" b="0" strike="noStrike" spc="-1">
-                <a:solidFill>
-                  <a:srgbClr val="EBEBEB"/>
-                </a:solidFill>
-                <a:latin typeface="Century Gothic"/>
-              </a:rPr>
-              <a:t> 2 </a:t>
-            </a:r>
-            <a:endParaRPr lang="en-US" sz="7200" b="0" strike="noStrike" spc="-1">
+              <a:t> Session 2 </a:t>
+            </a:r>
+            <a:endParaRPr lang="en-US" sz="7200" b="0" strike="noStrike" spc="-1" dirty="0">
               <a:latin typeface="Arial"/>
             </a:endParaRPr>
           </a:p>

</xml_diff>